<commit_message>
a lot of new stuff...
</commit_message>
<xml_diff>
--- a/testbed_ISSM/flatMISMIP_testbeds/plots/snapshots_together.pptx
+++ b/testbed_ISSM/flatMISMIP_testbeds/plots/snapshots_together.pptx
@@ -104,6 +104,11 @@
       </a:defRPr>
     </a:lvl9pPr>
   </p:defaultTextStyle>
+  <p:extLst>
+    <p:ext uri="{EFAFB233-063F-42B5-8137-9DF3F51BA10A}">
+      <p15:sldGuideLst xmlns:p15="http://schemas.microsoft.com/office/powerpoint/2012/main"/>
+    </p:ext>
+  </p:extLst>
 </p:presentation>
 </file>
 
@@ -238,7 +243,7 @@
           <a:p>
             <a:fld id="{510289F2-5DE5-3F44-AC87-25FFE44A7209}" type="datetimeFigureOut">
               <a:rPr lang="en-US" smtClean="0"/>
-              <a:t>2/19/23</a:t>
+              <a:t>2/20/23</a:t>
             </a:fld>
             <a:endParaRPr lang="en-US"/>
           </a:p>
@@ -408,7 +413,7 @@
           <a:p>
             <a:fld id="{510289F2-5DE5-3F44-AC87-25FFE44A7209}" type="datetimeFigureOut">
               <a:rPr lang="en-US" smtClean="0"/>
-              <a:t>2/19/23</a:t>
+              <a:t>2/20/23</a:t>
             </a:fld>
             <a:endParaRPr lang="en-US"/>
           </a:p>
@@ -588,7 +593,7 @@
           <a:p>
             <a:fld id="{510289F2-5DE5-3F44-AC87-25FFE44A7209}" type="datetimeFigureOut">
               <a:rPr lang="en-US" smtClean="0"/>
-              <a:t>2/19/23</a:t>
+              <a:t>2/20/23</a:t>
             </a:fld>
             <a:endParaRPr lang="en-US"/>
           </a:p>
@@ -758,7 +763,7 @@
           <a:p>
             <a:fld id="{510289F2-5DE5-3F44-AC87-25FFE44A7209}" type="datetimeFigureOut">
               <a:rPr lang="en-US" smtClean="0"/>
-              <a:t>2/19/23</a:t>
+              <a:t>2/20/23</a:t>
             </a:fld>
             <a:endParaRPr lang="en-US"/>
           </a:p>
@@ -1004,7 +1009,7 @@
           <a:p>
             <a:fld id="{510289F2-5DE5-3F44-AC87-25FFE44A7209}" type="datetimeFigureOut">
               <a:rPr lang="en-US" smtClean="0"/>
-              <a:t>2/19/23</a:t>
+              <a:t>2/20/23</a:t>
             </a:fld>
             <a:endParaRPr lang="en-US"/>
           </a:p>
@@ -1236,7 +1241,7 @@
           <a:p>
             <a:fld id="{510289F2-5DE5-3F44-AC87-25FFE44A7209}" type="datetimeFigureOut">
               <a:rPr lang="en-US" smtClean="0"/>
-              <a:t>2/19/23</a:t>
+              <a:t>2/20/23</a:t>
             </a:fld>
             <a:endParaRPr lang="en-US"/>
           </a:p>
@@ -1603,7 +1608,7 @@
           <a:p>
             <a:fld id="{510289F2-5DE5-3F44-AC87-25FFE44A7209}" type="datetimeFigureOut">
               <a:rPr lang="en-US" smtClean="0"/>
-              <a:t>2/19/23</a:t>
+              <a:t>2/20/23</a:t>
             </a:fld>
             <a:endParaRPr lang="en-US"/>
           </a:p>
@@ -1721,7 +1726,7 @@
           <a:p>
             <a:fld id="{510289F2-5DE5-3F44-AC87-25FFE44A7209}" type="datetimeFigureOut">
               <a:rPr lang="en-US" smtClean="0"/>
-              <a:t>2/19/23</a:t>
+              <a:t>2/20/23</a:t>
             </a:fld>
             <a:endParaRPr lang="en-US"/>
           </a:p>
@@ -1816,7 +1821,7 @@
           <a:p>
             <a:fld id="{510289F2-5DE5-3F44-AC87-25FFE44A7209}" type="datetimeFigureOut">
               <a:rPr lang="en-US" smtClean="0"/>
-              <a:t>2/19/23</a:t>
+              <a:t>2/20/23</a:t>
             </a:fld>
             <a:endParaRPr lang="en-US"/>
           </a:p>
@@ -2093,7 +2098,7 @@
           <a:p>
             <a:fld id="{510289F2-5DE5-3F44-AC87-25FFE44A7209}" type="datetimeFigureOut">
               <a:rPr lang="en-US" smtClean="0"/>
-              <a:t>2/19/23</a:t>
+              <a:t>2/20/23</a:t>
             </a:fld>
             <a:endParaRPr lang="en-US"/>
           </a:p>
@@ -2350,7 +2355,7 @@
           <a:p>
             <a:fld id="{510289F2-5DE5-3F44-AC87-25FFE44A7209}" type="datetimeFigureOut">
               <a:rPr lang="en-US" smtClean="0"/>
-              <a:t>2/19/23</a:t>
+              <a:t>2/20/23</a:t>
             </a:fld>
             <a:endParaRPr lang="en-US"/>
           </a:p>
@@ -2563,7 +2568,7 @@
           <a:p>
             <a:fld id="{510289F2-5DE5-3F44-AC87-25FFE44A7209}" type="datetimeFigureOut">
               <a:rPr lang="en-US" smtClean="0"/>
-              <a:t>2/19/23</a:t>
+              <a:t>2/20/23</a:t>
             </a:fld>
             <a:endParaRPr lang="en-US"/>
           </a:p>
@@ -3748,21 +3753,21 @@
             </a:r>
             <a:r>
               <a:rPr lang="en-US" dirty="0"/>
-              <a:t> coefficient | </a:t>
-            </a:r>
-            <a:r>
-              <a:rPr lang="en-US" dirty="0">
+              <a:t> coefficient |</a:t>
+            </a:r>
+            <a:r>
+              <a:rPr lang="en-US" b="1" dirty="0">
                 <a:solidFill>
-                  <a:schemeClr val="accent6">
+                  <a:schemeClr val="accent5">
                     <a:lumMod val="75000"/>
                   </a:schemeClr>
                 </a:solidFill>
               </a:rPr>
-              <a:t>Large</a:t>
+              <a:t> Large </a:t>
             </a:r>
             <a:r>
               <a:rPr lang="en-US" dirty="0"/>
-              <a:t> width</a:t>
+              <a:t>width</a:t>
             </a:r>
           </a:p>
         </p:txBody>

</xml_diff>